<commit_message>
Updates after review and restructuring for the new semester
</commit_message>
<xml_diff>
--- a/models_comp_comm/documents/Instruction Set Architecture.pptx
+++ b/models_comp_comm/documents/Instruction Set Architecture.pptx
@@ -807,7 +807,7 @@
   <p:cSld>
     <p:spTree>
       <p:nvGrpSpPr>
-        <p:cNvPr id="66" name="Shape 66"/>
+        <p:cNvPr id="67" name="Shape 67"/>
         <p:cNvGrpSpPr/>
         <p:nvPr/>
       </p:nvGrpSpPr>
@@ -821,7 +821,7 @@
       </p:grpSpPr>
       <p:sp>
         <p:nvSpPr>
-          <p:cNvPr id="67" name="Google Shape;67;gf02e65bbb2_0_125:notes"/>
+          <p:cNvPr id="68" name="Google Shape;68;gf02e65bbb2_0_125:notes"/>
           <p:cNvSpPr/>
           <p:nvPr>
             <p:ph idx="2" type="sldImg"/>
@@ -856,7 +856,7 @@
       </p:sp>
       <p:sp>
         <p:nvSpPr>
-          <p:cNvPr id="68" name="Google Shape;68;gf02e65bbb2_0_125:notes"/>
+          <p:cNvPr id="69" name="Google Shape;69;gf02e65bbb2_0_125:notes"/>
           <p:cNvSpPr txBox="1"/>
           <p:nvPr>
             <p:ph idx="1" type="body"/>
@@ -906,7 +906,7 @@
   <p:cSld>
     <p:spTree>
       <p:nvGrpSpPr>
-        <p:cNvPr id="73" name="Shape 73"/>
+        <p:cNvPr id="74" name="Shape 74"/>
         <p:cNvGrpSpPr/>
         <p:nvPr/>
       </p:nvGrpSpPr>
@@ -920,7 +920,7 @@
       </p:grpSpPr>
       <p:sp>
         <p:nvSpPr>
-          <p:cNvPr id="74" name="Google Shape;74;gf02e65bbb2_0_131:notes"/>
+          <p:cNvPr id="75" name="Google Shape;75;gf02e65bbb2_0_131:notes"/>
           <p:cNvSpPr/>
           <p:nvPr>
             <p:ph idx="2" type="sldImg"/>
@@ -955,7 +955,7 @@
       </p:sp>
       <p:sp>
         <p:nvSpPr>
-          <p:cNvPr id="75" name="Google Shape;75;gf02e65bbb2_0_131:notes"/>
+          <p:cNvPr id="76" name="Google Shape;76;gf02e65bbb2_0_131:notes"/>
           <p:cNvSpPr txBox="1"/>
           <p:nvPr>
             <p:ph idx="1" type="body"/>
@@ -1005,7 +1005,7 @@
   <p:cSld>
     <p:spTree>
       <p:nvGrpSpPr>
-        <p:cNvPr id="79" name="Shape 79"/>
+        <p:cNvPr id="80" name="Shape 80"/>
         <p:cNvGrpSpPr/>
         <p:nvPr/>
       </p:nvGrpSpPr>
@@ -1019,7 +1019,7 @@
       </p:grpSpPr>
       <p:sp>
         <p:nvSpPr>
-          <p:cNvPr id="80" name="Google Shape;80;gf02e65bbb2_0_136:notes"/>
+          <p:cNvPr id="81" name="Google Shape;81;gf02e65bbb2_0_136:notes"/>
           <p:cNvSpPr/>
           <p:nvPr>
             <p:ph idx="2" type="sldImg"/>
@@ -1054,7 +1054,7 @@
       </p:sp>
       <p:sp>
         <p:nvSpPr>
-          <p:cNvPr id="81" name="Google Shape;81;gf02e65bbb2_0_136:notes"/>
+          <p:cNvPr id="82" name="Google Shape;82;gf02e65bbb2_0_136:notes"/>
           <p:cNvSpPr txBox="1"/>
           <p:nvPr>
             <p:ph idx="1" type="body"/>
@@ -1104,7 +1104,7 @@
   <p:cSld>
     <p:spTree>
       <p:nvGrpSpPr>
-        <p:cNvPr id="86" name="Shape 86"/>
+        <p:cNvPr id="87" name="Shape 87"/>
         <p:cNvGrpSpPr/>
         <p:nvPr/>
       </p:nvGrpSpPr>
@@ -1118,7 +1118,7 @@
       </p:grpSpPr>
       <p:sp>
         <p:nvSpPr>
-          <p:cNvPr id="87" name="Google Shape;87;gf02e65bbb2_0_141:notes"/>
+          <p:cNvPr id="88" name="Google Shape;88;gf02e65bbb2_0_141:notes"/>
           <p:cNvSpPr/>
           <p:nvPr>
             <p:ph idx="2" type="sldImg"/>
@@ -1153,7 +1153,7 @@
       </p:sp>
       <p:sp>
         <p:nvSpPr>
-          <p:cNvPr id="88" name="Google Shape;88;gf02e65bbb2_0_141:notes"/>
+          <p:cNvPr id="89" name="Google Shape;89;gf02e65bbb2_0_141:notes"/>
           <p:cNvSpPr txBox="1"/>
           <p:nvPr>
             <p:ph idx="1" type="body"/>
@@ -1203,7 +1203,7 @@
   <p:cSld>
     <p:spTree>
       <p:nvGrpSpPr>
-        <p:cNvPr id="113" name="Shape 113"/>
+        <p:cNvPr id="114" name="Shape 114"/>
         <p:cNvGrpSpPr/>
         <p:nvPr/>
       </p:nvGrpSpPr>
@@ -1217,7 +1217,7 @@
       </p:grpSpPr>
       <p:sp>
         <p:nvSpPr>
-          <p:cNvPr id="114" name="Google Shape;114;gf02e65bbb2_0_146:notes"/>
+          <p:cNvPr id="115" name="Google Shape;115;gf02e65bbb2_0_146:notes"/>
           <p:cNvSpPr/>
           <p:nvPr>
             <p:ph idx="2" type="sldImg"/>
@@ -1252,7 +1252,7 @@
       </p:sp>
       <p:sp>
         <p:nvSpPr>
-          <p:cNvPr id="115" name="Google Shape;115;gf02e65bbb2_0_146:notes"/>
+          <p:cNvPr id="116" name="Google Shape;116;gf02e65bbb2_0_146:notes"/>
           <p:cNvSpPr txBox="1"/>
           <p:nvPr>
             <p:ph idx="1" type="body"/>
@@ -1302,7 +1302,7 @@
   <p:cSld>
     <p:spTree>
       <p:nvGrpSpPr>
-        <p:cNvPr id="121" name="Shape 121"/>
+        <p:cNvPr id="122" name="Shape 122"/>
         <p:cNvGrpSpPr/>
         <p:nvPr/>
       </p:nvGrpSpPr>
@@ -1316,7 +1316,7 @@
       </p:grpSpPr>
       <p:sp>
         <p:nvSpPr>
-          <p:cNvPr id="122" name="Google Shape;122;gf02e65bbb2_0_153:notes"/>
+          <p:cNvPr id="123" name="Google Shape;123;gf02e65bbb2_0_153:notes"/>
           <p:cNvSpPr/>
           <p:nvPr>
             <p:ph idx="2" type="sldImg"/>
@@ -1351,7 +1351,7 @@
       </p:sp>
       <p:sp>
         <p:nvSpPr>
-          <p:cNvPr id="123" name="Google Shape;123;gf02e65bbb2_0_153:notes"/>
+          <p:cNvPr id="124" name="Google Shape;124;gf02e65bbb2_0_153:notes"/>
           <p:cNvSpPr txBox="1"/>
           <p:nvPr>
             <p:ph idx="1" type="body"/>
@@ -1401,7 +1401,7 @@
   <p:cSld>
     <p:spTree>
       <p:nvGrpSpPr>
-        <p:cNvPr id="155" name="Shape 155"/>
+        <p:cNvPr id="156" name="Shape 156"/>
         <p:cNvGrpSpPr/>
         <p:nvPr/>
       </p:nvGrpSpPr>
@@ -1415,7 +1415,7 @@
       </p:grpSpPr>
       <p:sp>
         <p:nvSpPr>
-          <p:cNvPr id="156" name="Google Shape;156;gf02e65bbb2_0_0:notes"/>
+          <p:cNvPr id="157" name="Google Shape;157;gf02e65bbb2_0_0:notes"/>
           <p:cNvSpPr/>
           <p:nvPr>
             <p:ph idx="2" type="sldImg"/>
@@ -1450,7 +1450,7 @@
       </p:sp>
       <p:sp>
         <p:nvSpPr>
-          <p:cNvPr id="157" name="Google Shape;157;gf02e65bbb2_0_0:notes"/>
+          <p:cNvPr id="158" name="Google Shape;158;gf02e65bbb2_0_0:notes"/>
           <p:cNvSpPr txBox="1"/>
           <p:nvPr>
             <p:ph idx="1" type="body"/>
@@ -1500,7 +1500,7 @@
   <p:cSld>
     <p:spTree>
       <p:nvGrpSpPr>
-        <p:cNvPr id="165" name="Shape 165"/>
+        <p:cNvPr id="166" name="Shape 166"/>
         <p:cNvGrpSpPr/>
         <p:nvPr/>
       </p:nvGrpSpPr>
@@ -1514,7 +1514,7 @@
       </p:grpSpPr>
       <p:sp>
         <p:nvSpPr>
-          <p:cNvPr id="166" name="Google Shape;166;gf02e65bbb2_0_185:notes"/>
+          <p:cNvPr id="167" name="Google Shape;167;gf02e65bbb2_0_185:notes"/>
           <p:cNvSpPr/>
           <p:nvPr>
             <p:ph idx="2" type="sldImg"/>
@@ -1549,7 +1549,7 @@
       </p:sp>
       <p:sp>
         <p:nvSpPr>
-          <p:cNvPr id="167" name="Google Shape;167;gf02e65bbb2_0_185:notes"/>
+          <p:cNvPr id="168" name="Google Shape;168;gf02e65bbb2_0_185:notes"/>
           <p:cNvSpPr txBox="1"/>
           <p:nvPr>
             <p:ph idx="1" type="body"/>
@@ -6602,14 +6602,14 @@
               <a:spcAft>
                 <a:spcPts val="0"/>
               </a:spcAft>
-              <a:buSzPct val="107692"/>
+              <a:buSzPct val="100000"/>
               <a:buChar char="○"/>
             </a:pPr>
             <a:r>
               <a:rPr lang="en"/>
               <a:t>Complex Instruction Set Computer (CISC)</a:t>
             </a:r>
-            <a:endParaRPr sz="1300"/>
+            <a:endParaRPr/>
           </a:p>
         </p:txBody>
       </p:sp>
@@ -7118,6 +7118,57 @@
           </a:ln>
         </p:spPr>
       </p:cxnSp>
+      <p:sp>
+        <p:nvSpPr>
+          <p:cNvPr id="66" name="Google Shape;66;p13"/>
+          <p:cNvSpPr txBox="1"/>
+          <p:nvPr/>
+        </p:nvSpPr>
+        <p:spPr>
+          <a:xfrm>
+            <a:off x="-20850" y="4713150"/>
+            <a:ext cx="8362200" cy="400200"/>
+          </a:xfrm>
+          <a:prstGeom prst="rect">
+            <a:avLst/>
+          </a:prstGeom>
+          <a:noFill/>
+          <a:ln>
+            <a:noFill/>
+          </a:ln>
+        </p:spPr>
+        <p:txBody>
+          <a:bodyPr anchorCtr="0" anchor="t" bIns="91425" lIns="91425" spcFirstLastPara="1" rIns="91425" wrap="square" tIns="91425">
+            <a:spAutoFit/>
+          </a:bodyPr>
+          <a:lstStyle/>
+          <a:p>
+            <a:pPr indent="0" lvl="0" marL="0" rtl="0" algn="l">
+              <a:spcBef>
+                <a:spcPts val="0"/>
+              </a:spcBef>
+              <a:spcAft>
+                <a:spcPts val="0"/>
+              </a:spcAft>
+              <a:buNone/>
+            </a:pPr>
+            <a:r>
+              <a:rPr lang="en"/>
+              <a:t>Easy Read: </a:t>
+            </a:r>
+            <a:r>
+              <a:rPr lang="en" sz="1350" u="sng">
+                <a:solidFill>
+                  <a:schemeClr val="hlink"/>
+                </a:solidFill>
+                <a:hlinkClick r:id="rId3"/>
+              </a:rPr>
+              <a:t>https://medium.com/swlh/what-does-risc-and-cisc-mean-in-2020-7b4d42c9a9de</a:t>
+            </a:r>
+            <a:endParaRPr/>
+          </a:p>
+        </p:txBody>
+      </p:sp>
     </p:spTree>
   </p:cSld>
   <p:clrMapOvr>
@@ -7131,7 +7182,7 @@
   <p:cSld>
     <p:spTree>
       <p:nvGrpSpPr>
-        <p:cNvPr id="69" name="Shape 69"/>
+        <p:cNvPr id="70" name="Shape 70"/>
         <p:cNvGrpSpPr/>
         <p:nvPr/>
       </p:nvGrpSpPr>
@@ -7145,7 +7196,7 @@
       </p:grpSpPr>
       <p:sp>
         <p:nvSpPr>
-          <p:cNvPr id="70" name="Google Shape;70;p14"/>
+          <p:cNvPr id="71" name="Google Shape;71;p14"/>
           <p:cNvSpPr txBox="1"/>
           <p:nvPr>
             <p:ph type="title"/>
@@ -7185,7 +7236,7 @@
       </p:sp>
       <p:sp>
         <p:nvSpPr>
-          <p:cNvPr id="71" name="Google Shape;71;p14"/>
+          <p:cNvPr id="72" name="Google Shape;72;p14"/>
           <p:cNvSpPr txBox="1"/>
           <p:nvPr>
             <p:ph idx="1" type="body"/>
@@ -7360,7 +7411,7 @@
       </p:sp>
       <p:pic>
         <p:nvPicPr>
-          <p:cNvPr id="72" name="Google Shape;72;p14"/>
+          <p:cNvPr id="73" name="Google Shape;73;p14"/>
           <p:cNvPicPr preferRelativeResize="0"/>
           <p:nvPr/>
         </p:nvPicPr>
@@ -7399,7 +7450,7 @@
   <p:cSld>
     <p:spTree>
       <p:nvGrpSpPr>
-        <p:cNvPr id="76" name="Shape 76"/>
+        <p:cNvPr id="77" name="Shape 77"/>
         <p:cNvGrpSpPr/>
         <p:nvPr/>
       </p:nvGrpSpPr>
@@ -7413,7 +7464,7 @@
       </p:grpSpPr>
       <p:sp>
         <p:nvSpPr>
-          <p:cNvPr id="77" name="Google Shape;77;p15"/>
+          <p:cNvPr id="78" name="Google Shape;78;p15"/>
           <p:cNvSpPr txBox="1"/>
           <p:nvPr>
             <p:ph type="title"/>
@@ -7453,7 +7504,7 @@
       </p:sp>
       <p:pic>
         <p:nvPicPr>
-          <p:cNvPr id="78" name="Google Shape;78;p15"/>
+          <p:cNvPr id="79" name="Google Shape;79;p15"/>
           <p:cNvPicPr preferRelativeResize="0"/>
           <p:nvPr/>
         </p:nvPicPr>
@@ -7492,7 +7543,7 @@
   <p:cSld>
     <p:spTree>
       <p:nvGrpSpPr>
-        <p:cNvPr id="82" name="Shape 82"/>
+        <p:cNvPr id="83" name="Shape 83"/>
         <p:cNvGrpSpPr/>
         <p:nvPr/>
       </p:nvGrpSpPr>
@@ -7506,7 +7557,7 @@
       </p:grpSpPr>
       <p:sp>
         <p:nvSpPr>
-          <p:cNvPr id="83" name="Google Shape;83;p16"/>
+          <p:cNvPr id="84" name="Google Shape;84;p16"/>
           <p:cNvSpPr txBox="1"/>
           <p:nvPr>
             <p:ph type="title"/>
@@ -7546,7 +7597,7 @@
       </p:sp>
       <p:graphicFrame>
         <p:nvGraphicFramePr>
-          <p:cNvPr id="84" name="Google Shape;84;p16"/>
+          <p:cNvPr id="85" name="Google Shape;85;p16"/>
           <p:cNvGraphicFramePr/>
           <p:nvPr/>
         </p:nvGraphicFramePr>
@@ -7559,7 +7610,7 @@
             <a:tbl>
               <a:tblPr>
                 <a:noFill/>
-                <a:tableStyleId>{4A60D4A6-5074-468F-8D76-4637425AFB03}</a:tableStyleId>
+                <a:tableStyleId>{D31D267A-E17D-4F10-BA80-475C2B174075}</a:tableStyleId>
               </a:tblPr>
               <a:tblGrid>
                 <a:gridCol w="935025"/>
@@ -9828,7 +9879,7 @@
       </p:graphicFrame>
       <p:pic>
         <p:nvPicPr>
-          <p:cNvPr id="85" name="Google Shape;85;p16"/>
+          <p:cNvPr id="86" name="Google Shape;86;p16"/>
           <p:cNvPicPr preferRelativeResize="0"/>
           <p:nvPr/>
         </p:nvPicPr>
@@ -9867,7 +9918,7 @@
   <p:cSld>
     <p:spTree>
       <p:nvGrpSpPr>
-        <p:cNvPr id="89" name="Shape 89"/>
+        <p:cNvPr id="90" name="Shape 90"/>
         <p:cNvGrpSpPr/>
         <p:nvPr/>
       </p:nvGrpSpPr>
@@ -9881,7 +9932,7 @@
       </p:grpSpPr>
       <p:sp>
         <p:nvSpPr>
-          <p:cNvPr id="90" name="Google Shape;90;p17"/>
+          <p:cNvPr id="91" name="Google Shape;91;p17"/>
           <p:cNvSpPr txBox="1"/>
           <p:nvPr>
             <p:ph type="title"/>
@@ -9921,7 +9972,7 @@
       </p:sp>
       <p:sp>
         <p:nvSpPr>
-          <p:cNvPr id="91" name="Google Shape;91;p17"/>
+          <p:cNvPr id="92" name="Google Shape;92;p17"/>
           <p:cNvSpPr txBox="1"/>
           <p:nvPr>
             <p:ph idx="1" type="body"/>
@@ -10304,7 +10355,7 @@
       </p:sp>
       <p:sp>
         <p:nvSpPr>
-          <p:cNvPr id="92" name="Google Shape;92;p17"/>
+          <p:cNvPr id="93" name="Google Shape;93;p17"/>
           <p:cNvSpPr txBox="1"/>
           <p:nvPr/>
         </p:nvSpPr>
@@ -10346,7 +10397,7 @@
       </p:sp>
       <p:sp>
         <p:nvSpPr>
-          <p:cNvPr id="93" name="Google Shape;93;p17"/>
+          <p:cNvPr id="94" name="Google Shape;94;p17"/>
           <p:cNvSpPr/>
           <p:nvPr/>
         </p:nvSpPr>
@@ -10395,7 +10446,7 @@
       </p:sp>
       <p:sp>
         <p:nvSpPr>
-          <p:cNvPr id="94" name="Google Shape;94;p17"/>
+          <p:cNvPr id="95" name="Google Shape;95;p17"/>
           <p:cNvSpPr/>
           <p:nvPr/>
         </p:nvSpPr>
@@ -10444,7 +10495,7 @@
       </p:sp>
       <p:sp>
         <p:nvSpPr>
-          <p:cNvPr id="95" name="Google Shape;95;p17"/>
+          <p:cNvPr id="96" name="Google Shape;96;p17"/>
           <p:cNvSpPr/>
           <p:nvPr/>
         </p:nvSpPr>
@@ -10493,7 +10544,7 @@
       </p:sp>
       <p:sp>
         <p:nvSpPr>
-          <p:cNvPr id="96" name="Google Shape;96;p17"/>
+          <p:cNvPr id="97" name="Google Shape;97;p17"/>
           <p:cNvSpPr/>
           <p:nvPr/>
         </p:nvSpPr>
@@ -10542,7 +10593,7 @@
       </p:sp>
       <p:sp>
         <p:nvSpPr>
-          <p:cNvPr id="97" name="Google Shape;97;p17"/>
+          <p:cNvPr id="98" name="Google Shape;98;p17"/>
           <p:cNvSpPr/>
           <p:nvPr/>
         </p:nvSpPr>
@@ -10591,7 +10642,7 @@
       </p:sp>
       <p:sp>
         <p:nvSpPr>
-          <p:cNvPr id="98" name="Google Shape;98;p17"/>
+          <p:cNvPr id="99" name="Google Shape;99;p17"/>
           <p:cNvSpPr/>
           <p:nvPr/>
         </p:nvSpPr>
@@ -10640,7 +10691,7 @@
       </p:sp>
       <p:sp>
         <p:nvSpPr>
-          <p:cNvPr id="99" name="Google Shape;99;p17"/>
+          <p:cNvPr id="100" name="Google Shape;100;p17"/>
           <p:cNvSpPr/>
           <p:nvPr/>
         </p:nvSpPr>
@@ -10689,7 +10740,7 @@
       </p:sp>
       <p:sp>
         <p:nvSpPr>
-          <p:cNvPr id="100" name="Google Shape;100;p17"/>
+          <p:cNvPr id="101" name="Google Shape;101;p17"/>
           <p:cNvSpPr/>
           <p:nvPr/>
         </p:nvSpPr>
@@ -10738,7 +10789,7 @@
       </p:sp>
       <p:sp>
         <p:nvSpPr>
-          <p:cNvPr id="101" name="Google Shape;101;p17"/>
+          <p:cNvPr id="102" name="Google Shape;102;p17"/>
           <p:cNvSpPr/>
           <p:nvPr/>
         </p:nvSpPr>
@@ -10787,7 +10838,7 @@
       </p:sp>
       <p:sp>
         <p:nvSpPr>
-          <p:cNvPr id="102" name="Google Shape;102;p17"/>
+          <p:cNvPr id="103" name="Google Shape;103;p17"/>
           <p:cNvSpPr/>
           <p:nvPr/>
         </p:nvSpPr>
@@ -10836,7 +10887,7 @@
       </p:sp>
       <p:sp>
         <p:nvSpPr>
-          <p:cNvPr id="103" name="Google Shape;103;p17"/>
+          <p:cNvPr id="104" name="Google Shape;104;p17"/>
           <p:cNvSpPr/>
           <p:nvPr/>
         </p:nvSpPr>
@@ -10885,7 +10936,7 @@
       </p:sp>
       <p:sp>
         <p:nvSpPr>
-          <p:cNvPr id="104" name="Google Shape;104;p17"/>
+          <p:cNvPr id="105" name="Google Shape;105;p17"/>
           <p:cNvSpPr txBox="1"/>
           <p:nvPr/>
         </p:nvSpPr>
@@ -10927,7 +10978,7 @@
       </p:sp>
       <p:sp>
         <p:nvSpPr>
-          <p:cNvPr id="105" name="Google Shape;105;p17"/>
+          <p:cNvPr id="106" name="Google Shape;106;p17"/>
           <p:cNvSpPr txBox="1"/>
           <p:nvPr/>
         </p:nvSpPr>
@@ -10969,7 +11020,7 @@
       </p:sp>
       <p:sp>
         <p:nvSpPr>
-          <p:cNvPr id="106" name="Google Shape;106;p17"/>
+          <p:cNvPr id="107" name="Google Shape;107;p17"/>
           <p:cNvSpPr txBox="1"/>
           <p:nvPr/>
         </p:nvSpPr>
@@ -11011,7 +11062,7 @@
       </p:sp>
       <p:sp>
         <p:nvSpPr>
-          <p:cNvPr id="107" name="Google Shape;107;p17"/>
+          <p:cNvPr id="108" name="Google Shape;108;p17"/>
           <p:cNvSpPr txBox="1"/>
           <p:nvPr/>
         </p:nvSpPr>
@@ -11053,9 +11104,9 @@
       </p:sp>
       <p:cxnSp>
         <p:nvCxnSpPr>
-          <p:cNvPr id="108" name="Google Shape;108;p17"/>
+          <p:cNvPr id="109" name="Google Shape;109;p17"/>
           <p:cNvCxnSpPr>
-            <a:stCxn id="109" idx="1"/>
+            <a:stCxn id="110" idx="1"/>
           </p:cNvCxnSpPr>
           <p:nvPr/>
         </p:nvCxnSpPr>
@@ -11083,7 +11134,7 @@
       </p:cxnSp>
       <p:sp>
         <p:nvSpPr>
-          <p:cNvPr id="110" name="Google Shape;110;p17"/>
+          <p:cNvPr id="111" name="Google Shape;111;p17"/>
           <p:cNvSpPr txBox="1"/>
           <p:nvPr/>
         </p:nvSpPr>
@@ -11132,7 +11183,7 @@
       </p:sp>
       <p:sp>
         <p:nvSpPr>
-          <p:cNvPr id="109" name="Google Shape;109;p17"/>
+          <p:cNvPr id="110" name="Google Shape;110;p17"/>
           <p:cNvSpPr txBox="1"/>
           <p:nvPr/>
         </p:nvSpPr>
@@ -11174,7 +11225,7 @@
       </p:sp>
       <p:sp>
         <p:nvSpPr>
-          <p:cNvPr id="111" name="Google Shape;111;p17"/>
+          <p:cNvPr id="112" name="Google Shape;112;p17"/>
           <p:cNvSpPr txBox="1"/>
           <p:nvPr/>
         </p:nvSpPr>
@@ -11216,7 +11267,7 @@
       </p:sp>
       <p:sp>
         <p:nvSpPr>
-          <p:cNvPr id="112" name="Google Shape;112;p17"/>
+          <p:cNvPr id="113" name="Google Shape;113;p17"/>
           <p:cNvSpPr txBox="1"/>
           <p:nvPr/>
         </p:nvSpPr>
@@ -11269,7 +11320,7 @@
   <p:cSld>
     <p:spTree>
       <p:nvGrpSpPr>
-        <p:cNvPr id="116" name="Shape 116"/>
+        <p:cNvPr id="117" name="Shape 117"/>
         <p:cNvGrpSpPr/>
         <p:nvPr/>
       </p:nvGrpSpPr>
@@ -11283,7 +11334,7 @@
       </p:grpSpPr>
       <p:sp>
         <p:nvSpPr>
-          <p:cNvPr id="117" name="Google Shape;117;p18"/>
+          <p:cNvPr id="118" name="Google Shape;118;p18"/>
           <p:cNvSpPr txBox="1"/>
           <p:nvPr>
             <p:ph type="title"/>
@@ -11323,7 +11374,7 @@
       </p:sp>
       <p:sp>
         <p:nvSpPr>
-          <p:cNvPr id="118" name="Google Shape;118;p18"/>
+          <p:cNvPr id="119" name="Google Shape;119;p18"/>
           <p:cNvSpPr txBox="1"/>
           <p:nvPr>
             <p:ph idx="1" type="body"/>
@@ -11515,7 +11566,7 @@
       </p:sp>
       <p:pic>
         <p:nvPicPr>
-          <p:cNvPr id="119" name="Google Shape;119;p18"/>
+          <p:cNvPr id="120" name="Google Shape;120;p18"/>
           <p:cNvPicPr preferRelativeResize="0"/>
           <p:nvPr/>
         </p:nvPicPr>
@@ -11542,7 +11593,7 @@
       </p:pic>
       <p:sp>
         <p:nvSpPr>
-          <p:cNvPr id="120" name="Google Shape;120;p18"/>
+          <p:cNvPr id="121" name="Google Shape;121;p18"/>
           <p:cNvSpPr txBox="1"/>
           <p:nvPr/>
         </p:nvSpPr>
@@ -11595,7 +11646,7 @@
   <p:cSld>
     <p:spTree>
       <p:nvGrpSpPr>
-        <p:cNvPr id="124" name="Shape 124"/>
+        <p:cNvPr id="125" name="Shape 125"/>
         <p:cNvGrpSpPr/>
         <p:nvPr/>
       </p:nvGrpSpPr>
@@ -11609,7 +11660,7 @@
       </p:grpSpPr>
       <p:sp>
         <p:nvSpPr>
-          <p:cNvPr id="125" name="Google Shape;125;p19"/>
+          <p:cNvPr id="126" name="Google Shape;126;p19"/>
           <p:cNvSpPr txBox="1"/>
           <p:nvPr>
             <p:ph type="title"/>
@@ -11649,7 +11700,7 @@
       </p:sp>
       <p:sp>
         <p:nvSpPr>
-          <p:cNvPr id="126" name="Google Shape;126;p19"/>
+          <p:cNvPr id="127" name="Google Shape;127;p19"/>
           <p:cNvSpPr txBox="1"/>
           <p:nvPr>
             <p:ph idx="1" type="body"/>
@@ -11844,7 +11895,7 @@
       </p:sp>
       <p:pic>
         <p:nvPicPr>
-          <p:cNvPr id="127" name="Google Shape;127;p19"/>
+          <p:cNvPr id="128" name="Google Shape;128;p19"/>
           <p:cNvPicPr preferRelativeResize="0"/>
           <p:nvPr/>
         </p:nvPicPr>
@@ -11872,7 +11923,7 @@
       </p:pic>
       <p:sp>
         <p:nvSpPr>
-          <p:cNvPr id="128" name="Google Shape;128;p19"/>
+          <p:cNvPr id="129" name="Google Shape;129;p19"/>
           <p:cNvSpPr/>
           <p:nvPr/>
         </p:nvSpPr>
@@ -11926,7 +11977,7 @@
       </p:sp>
       <p:sp>
         <p:nvSpPr>
-          <p:cNvPr id="129" name="Google Shape;129;p19"/>
+          <p:cNvPr id="130" name="Google Shape;130;p19"/>
           <p:cNvSpPr/>
           <p:nvPr/>
         </p:nvSpPr>
@@ -11980,7 +12031,7 @@
       </p:sp>
       <p:sp>
         <p:nvSpPr>
-          <p:cNvPr id="130" name="Google Shape;130;p19"/>
+          <p:cNvPr id="131" name="Google Shape;131;p19"/>
           <p:cNvSpPr/>
           <p:nvPr/>
         </p:nvSpPr>
@@ -12034,7 +12085,7 @@
       </p:sp>
       <p:sp>
         <p:nvSpPr>
-          <p:cNvPr id="131" name="Google Shape;131;p19"/>
+          <p:cNvPr id="132" name="Google Shape;132;p19"/>
           <p:cNvSpPr/>
           <p:nvPr/>
         </p:nvSpPr>
@@ -12088,7 +12139,7 @@
       </p:sp>
       <p:sp>
         <p:nvSpPr>
-          <p:cNvPr id="132" name="Google Shape;132;p19"/>
+          <p:cNvPr id="133" name="Google Shape;133;p19"/>
           <p:cNvSpPr/>
           <p:nvPr/>
         </p:nvSpPr>
@@ -12142,7 +12193,7 @@
       </p:sp>
       <p:sp>
         <p:nvSpPr>
-          <p:cNvPr id="133" name="Google Shape;133;p19"/>
+          <p:cNvPr id="134" name="Google Shape;134;p19"/>
           <p:cNvSpPr/>
           <p:nvPr/>
         </p:nvSpPr>
@@ -12196,7 +12247,7 @@
       </p:sp>
       <p:sp>
         <p:nvSpPr>
-          <p:cNvPr id="134" name="Google Shape;134;p19"/>
+          <p:cNvPr id="135" name="Google Shape;135;p19"/>
           <p:cNvSpPr/>
           <p:nvPr/>
         </p:nvSpPr>
@@ -12250,7 +12301,7 @@
       </p:sp>
       <p:sp>
         <p:nvSpPr>
-          <p:cNvPr id="135" name="Google Shape;135;p19"/>
+          <p:cNvPr id="136" name="Google Shape;136;p19"/>
           <p:cNvSpPr/>
           <p:nvPr/>
         </p:nvSpPr>
@@ -12304,7 +12355,7 @@
       </p:sp>
       <p:cxnSp>
         <p:nvCxnSpPr>
-          <p:cNvPr id="136" name="Google Shape;136;p19"/>
+          <p:cNvPr id="137" name="Google Shape;137;p19"/>
           <p:cNvCxnSpPr/>
           <p:nvPr/>
         </p:nvCxnSpPr>
@@ -12330,34 +12381,6 @@
       </p:cxnSp>
       <p:cxnSp>
         <p:nvCxnSpPr>
-          <p:cNvPr id="137" name="Google Shape;137;p19"/>
-          <p:cNvCxnSpPr>
-            <a:endCxn id="128" idx="0"/>
-          </p:cNvCxnSpPr>
-          <p:nvPr/>
-        </p:nvCxnSpPr>
-        <p:spPr>
-          <a:xfrm flipH="1">
-            <a:off x="1287700" y="3390800"/>
-            <a:ext cx="2944200" cy="1108800"/>
-          </a:xfrm>
-          <a:prstGeom prst="straightConnector1">
-            <a:avLst/>
-          </a:prstGeom>
-          <a:noFill/>
-          <a:ln cap="flat" cmpd="sng" w="9525">
-            <a:solidFill>
-              <a:schemeClr val="dk2"/>
-            </a:solidFill>
-            <a:prstDash val="solid"/>
-            <a:round/>
-            <a:headEnd len="med" w="med" type="none"/>
-            <a:tailEnd len="med" w="med" type="triangle"/>
-          </a:ln>
-        </p:spPr>
-      </p:cxnSp>
-      <p:cxnSp>
-        <p:nvCxnSpPr>
           <p:cNvPr id="138" name="Google Shape;138;p19"/>
           <p:cNvCxnSpPr>
             <a:endCxn id="129" idx="0"/>
@@ -12366,8 +12389,8 @@
         </p:nvCxnSpPr>
         <p:spPr>
           <a:xfrm flipH="1">
-            <a:off x="1967800" y="3686000"/>
-            <a:ext cx="2264100" cy="813600"/>
+            <a:off x="1287700" y="3390800"/>
+            <a:ext cx="2944200" cy="1108800"/>
           </a:xfrm>
           <a:prstGeom prst="straightConnector1">
             <a:avLst/>
@@ -12394,6 +12417,34 @@
         </p:nvCxnSpPr>
         <p:spPr>
           <a:xfrm flipH="1">
+            <a:off x="1967800" y="3686000"/>
+            <a:ext cx="2264100" cy="813600"/>
+          </a:xfrm>
+          <a:prstGeom prst="straightConnector1">
+            <a:avLst/>
+          </a:prstGeom>
+          <a:noFill/>
+          <a:ln cap="flat" cmpd="sng" w="9525">
+            <a:solidFill>
+              <a:schemeClr val="dk2"/>
+            </a:solidFill>
+            <a:prstDash val="solid"/>
+            <a:round/>
+            <a:headEnd len="med" w="med" type="none"/>
+            <a:tailEnd len="med" w="med" type="triangle"/>
+          </a:ln>
+        </p:spPr>
+      </p:cxnSp>
+      <p:cxnSp>
+        <p:nvCxnSpPr>
+          <p:cNvPr id="140" name="Google Shape;140;p19"/>
+          <p:cNvCxnSpPr>
+            <a:endCxn id="131" idx="0"/>
+          </p:cNvCxnSpPr>
+          <p:nvPr/>
+        </p:nvCxnSpPr>
+        <p:spPr>
+          <a:xfrm flipH="1">
             <a:off x="2647900" y="3981200"/>
             <a:ext cx="1584000" cy="518400"/>
           </a:xfrm>
@@ -12414,10 +12465,10 @@
       </p:cxnSp>
       <p:cxnSp>
         <p:nvCxnSpPr>
-          <p:cNvPr id="140" name="Google Shape;140;p19"/>
+          <p:cNvPr id="141" name="Google Shape;141;p19"/>
           <p:cNvCxnSpPr>
-            <a:stCxn id="132" idx="1"/>
-            <a:endCxn id="131" idx="0"/>
+            <a:stCxn id="133" idx="1"/>
+            <a:endCxn id="132" idx="0"/>
           </p:cNvCxnSpPr>
           <p:nvPr/>
         </p:nvCxnSpPr>
@@ -12443,7 +12494,7 @@
       </p:cxnSp>
       <p:cxnSp>
         <p:nvCxnSpPr>
-          <p:cNvPr id="141" name="Google Shape;141;p19"/>
+          <p:cNvPr id="142" name="Google Shape;142;p19"/>
           <p:cNvCxnSpPr/>
           <p:nvPr/>
         </p:nvCxnSpPr>
@@ -12469,7 +12520,7 @@
       </p:cxnSp>
       <p:sp>
         <p:nvSpPr>
-          <p:cNvPr id="142" name="Google Shape;142;p19"/>
+          <p:cNvPr id="143" name="Google Shape;143;p19"/>
           <p:cNvSpPr/>
           <p:nvPr/>
         </p:nvSpPr>
@@ -12523,7 +12574,7 @@
       </p:sp>
       <p:sp>
         <p:nvSpPr>
-          <p:cNvPr id="143" name="Google Shape;143;p19"/>
+          <p:cNvPr id="144" name="Google Shape;144;p19"/>
           <p:cNvSpPr/>
           <p:nvPr/>
         </p:nvSpPr>
@@ -12577,7 +12628,7 @@
       </p:sp>
       <p:sp>
         <p:nvSpPr>
-          <p:cNvPr id="144" name="Google Shape;144;p19"/>
+          <p:cNvPr id="145" name="Google Shape;145;p19"/>
           <p:cNvSpPr/>
           <p:nvPr/>
         </p:nvSpPr>
@@ -12631,7 +12682,7 @@
       </p:sp>
       <p:sp>
         <p:nvSpPr>
-          <p:cNvPr id="145" name="Google Shape;145;p19"/>
+          <p:cNvPr id="146" name="Google Shape;146;p19"/>
           <p:cNvSpPr/>
           <p:nvPr/>
         </p:nvSpPr>
@@ -12685,10 +12736,10 @@
       </p:sp>
       <p:cxnSp>
         <p:nvCxnSpPr>
-          <p:cNvPr id="146" name="Google Shape;146;p19"/>
+          <p:cNvPr id="147" name="Google Shape;147;p19"/>
           <p:cNvCxnSpPr>
-            <a:stCxn id="132" idx="3"/>
-            <a:endCxn id="142" idx="0"/>
+            <a:stCxn id="133" idx="3"/>
+            <a:endCxn id="143" idx="0"/>
           </p:cNvCxnSpPr>
           <p:nvPr/>
         </p:nvCxnSpPr>
@@ -12714,10 +12765,10 @@
       </p:cxnSp>
       <p:cxnSp>
         <p:nvCxnSpPr>
-          <p:cNvPr id="147" name="Google Shape;147;p19"/>
+          <p:cNvPr id="148" name="Google Shape;148;p19"/>
           <p:cNvCxnSpPr>
-            <a:stCxn id="133" idx="3"/>
-            <a:endCxn id="143" idx="0"/>
+            <a:stCxn id="134" idx="3"/>
+            <a:endCxn id="144" idx="0"/>
           </p:cNvCxnSpPr>
           <p:nvPr/>
         </p:nvCxnSpPr>
@@ -12743,7 +12794,7 @@
       </p:cxnSp>
       <p:sp>
         <p:nvSpPr>
-          <p:cNvPr id="148" name="Google Shape;148;p19"/>
+          <p:cNvPr id="149" name="Google Shape;149;p19"/>
           <p:cNvSpPr txBox="1"/>
           <p:nvPr/>
         </p:nvSpPr>
@@ -12785,7 +12836,7 @@
       </p:sp>
       <p:sp>
         <p:nvSpPr>
-          <p:cNvPr id="149" name="Google Shape;149;p19"/>
+          <p:cNvPr id="150" name="Google Shape;150;p19"/>
           <p:cNvSpPr txBox="1"/>
           <p:nvPr/>
         </p:nvSpPr>
@@ -12827,7 +12878,7 @@
       </p:sp>
       <p:sp>
         <p:nvSpPr>
-          <p:cNvPr id="150" name="Google Shape;150;p19"/>
+          <p:cNvPr id="151" name="Google Shape;151;p19"/>
           <p:cNvSpPr txBox="1"/>
           <p:nvPr/>
         </p:nvSpPr>
@@ -12869,9 +12920,9 @@
       </p:sp>
       <p:cxnSp>
         <p:nvCxnSpPr>
-          <p:cNvPr id="151" name="Google Shape;151;p19"/>
+          <p:cNvPr id="152" name="Google Shape;152;p19"/>
           <p:cNvCxnSpPr>
-            <a:stCxn id="148" idx="3"/>
+            <a:stCxn id="149" idx="3"/>
           </p:cNvCxnSpPr>
           <p:nvPr/>
         </p:nvCxnSpPr>
@@ -12897,7 +12948,7 @@
       </p:cxnSp>
       <p:cxnSp>
         <p:nvCxnSpPr>
-          <p:cNvPr id="152" name="Google Shape;152;p19"/>
+          <p:cNvPr id="153" name="Google Shape;153;p19"/>
           <p:cNvCxnSpPr/>
           <p:nvPr/>
         </p:nvCxnSpPr>
@@ -12923,9 +12974,9 @@
       </p:cxnSp>
       <p:cxnSp>
         <p:nvCxnSpPr>
-          <p:cNvPr id="153" name="Google Shape;153;p19"/>
+          <p:cNvPr id="154" name="Google Shape;154;p19"/>
           <p:cNvCxnSpPr>
-            <a:stCxn id="149" idx="3"/>
+            <a:stCxn id="150" idx="3"/>
           </p:cNvCxnSpPr>
           <p:nvPr/>
         </p:nvCxnSpPr>
@@ -12951,7 +13002,7 @@
       </p:cxnSp>
       <p:sp>
         <p:nvSpPr>
-          <p:cNvPr id="154" name="Google Shape;154;p19"/>
+          <p:cNvPr id="155" name="Google Shape;155;p19"/>
           <p:cNvSpPr txBox="1"/>
           <p:nvPr/>
         </p:nvSpPr>
@@ -13055,7 +13106,7 @@
   <p:cSld>
     <p:spTree>
       <p:nvGrpSpPr>
-        <p:cNvPr id="158" name="Shape 158"/>
+        <p:cNvPr id="159" name="Shape 159"/>
         <p:cNvGrpSpPr/>
         <p:nvPr/>
       </p:nvGrpSpPr>
@@ -13069,7 +13120,7 @@
       </p:grpSpPr>
       <p:sp>
         <p:nvSpPr>
-          <p:cNvPr id="159" name="Google Shape;159;p20"/>
+          <p:cNvPr id="160" name="Google Shape;160;p20"/>
           <p:cNvSpPr txBox="1"/>
           <p:nvPr>
             <p:ph type="title"/>
@@ -13113,7 +13164,7 @@
       </p:sp>
       <p:sp>
         <p:nvSpPr>
-          <p:cNvPr id="160" name="Google Shape;160;p20"/>
+          <p:cNvPr id="161" name="Google Shape;161;p20"/>
           <p:cNvSpPr txBox="1"/>
           <p:nvPr>
             <p:ph idx="1" type="body"/>
@@ -14279,7 +14330,7 @@
       </p:sp>
       <p:sp>
         <p:nvSpPr>
-          <p:cNvPr id="161" name="Google Shape;161;p20"/>
+          <p:cNvPr id="162" name="Google Shape;162;p20"/>
           <p:cNvSpPr/>
           <p:nvPr/>
         </p:nvSpPr>
@@ -14333,7 +14384,7 @@
       </p:sp>
       <p:sp>
         <p:nvSpPr>
-          <p:cNvPr id="162" name="Google Shape;162;p20"/>
+          <p:cNvPr id="163" name="Google Shape;163;p20"/>
           <p:cNvSpPr/>
           <p:nvPr/>
         </p:nvSpPr>
@@ -14386,7 +14437,7 @@
       </p:sp>
       <p:sp>
         <p:nvSpPr>
-          <p:cNvPr id="163" name="Google Shape;163;p20"/>
+          <p:cNvPr id="164" name="Google Shape;164;p20"/>
           <p:cNvSpPr/>
           <p:nvPr/>
         </p:nvSpPr>
@@ -14443,7 +14494,7 @@
       </p:sp>
       <p:sp>
         <p:nvSpPr>
-          <p:cNvPr id="164" name="Google Shape;164;p20"/>
+          <p:cNvPr id="165" name="Google Shape;165;p20"/>
           <p:cNvSpPr/>
           <p:nvPr/>
         </p:nvSpPr>
@@ -14507,7 +14558,7 @@
   <p:cSld>
     <p:spTree>
       <p:nvGrpSpPr>
-        <p:cNvPr id="168" name="Shape 168"/>
+        <p:cNvPr id="169" name="Shape 169"/>
         <p:cNvGrpSpPr/>
         <p:nvPr/>
       </p:nvGrpSpPr>
@@ -14521,7 +14572,7 @@
       </p:grpSpPr>
       <p:sp>
         <p:nvSpPr>
-          <p:cNvPr id="169" name="Google Shape;169;p21"/>
+          <p:cNvPr id="170" name="Google Shape;170;p21"/>
           <p:cNvSpPr txBox="1"/>
           <p:nvPr>
             <p:ph type="title"/>
@@ -14561,7 +14612,7 @@
       </p:sp>
       <p:sp>
         <p:nvSpPr>
-          <p:cNvPr id="170" name="Google Shape;170;p21"/>
+          <p:cNvPr id="171" name="Google Shape;171;p21"/>
           <p:cNvSpPr txBox="1"/>
           <p:nvPr>
             <p:ph idx="1" type="body"/>
@@ -14602,7 +14653,7 @@
       </p:sp>
       <p:graphicFrame>
         <p:nvGraphicFramePr>
-          <p:cNvPr id="171" name="Google Shape;171;p21"/>
+          <p:cNvPr id="172" name="Google Shape;172;p21"/>
           <p:cNvGraphicFramePr/>
           <p:nvPr/>
         </p:nvGraphicFramePr>
@@ -14615,7 +14666,7 @@
             <a:tbl>
               <a:tblPr>
                 <a:noFill/>
-                <a:tableStyleId>{4A60D4A6-5074-468F-8D76-4637425AFB03}</a:tableStyleId>
+                <a:tableStyleId>{D31D267A-E17D-4F10-BA80-475C2B174075}</a:tableStyleId>
               </a:tblPr>
               <a:tblGrid>
                 <a:gridCol w="1469750"/>

</xml_diff>